<commit_message>
added power point to latex
</commit_message>
<xml_diff>
--- a/Englisch_KIT.pptx
+++ b/Englisch_KIT.pptx
@@ -165,8 +165,19 @@
         </p15:guide>
       </p15:sldGuideLst>
     </p:ext>
+    <p:ext uri="{2D200454-40CA-4A62-9FC3-DE9A4176ACB9}">
+      <p15:notesGuideLst xmlns:p15="http://schemas.microsoft.com/office/powerpoint/2012/main"/>
+    </p:ext>
   </p:extLst>
 </p:presentation>
+</file>
+
+<file path=ppt/revisionInfo.xml><?xml version="1.0" encoding="utf-8"?>
+<p1510:revInfo xmlns:a="http://schemas.openxmlformats.org/drawingml/2006/main" xmlns:r="http://schemas.openxmlformats.org/officeDocument/2006/relationships" xmlns:p1510="http://schemas.microsoft.com/office/powerpoint/2015/10/main">
+  <p1510:revLst>
+    <p1510:client id="{67814BBC-5E0C-4EBF-AAE7-3E4D3D5A3432}" v="1" dt="2020-01-20T17:13:30.488"/>
+  </p1510:revLst>
+</p1510:revInfo>
 </file>
 
 <file path=ppt/handoutMasters/handoutMaster1.xml><?xml version="1.0" encoding="utf-8"?>
@@ -244,10 +255,7 @@
             <a:pPr>
               <a:defRPr/>
             </a:pPr>
-            <a:r>
-              <a:rPr lang="de-DE"/>
-              <a:t>Prof. Dr. Max Mustermann | Musterfakultät</a:t>
-            </a:r>
+            <a:endParaRPr lang="de-DE"/>
           </a:p>
         </p:txBody>
       </p:sp>
@@ -523,6 +531,7 @@
     </p:spTree>
   </p:cSld>
   <p:clrMap bg1="lt1" tx1="dk1" bg2="lt2" tx2="dk2" accent1="accent1" accent2="accent2" accent3="accent3" accent4="accent4" accent5="accent5" accent6="accent6" hlink="hlink" folHlink="folHlink"/>
+  <p:hf hdr="0" dt="0"/>
 </p:handoutMaster>
 </file>
 
@@ -669,7 +678,7 @@
             </a:extLst>
           </p:cNvPr>
           <p:cNvSpPr>
-            <a:spLocks noRot="1" noChangeArrowheads="1" noTextEdit="1"/>
+            <a:spLocks noGrp="1" noRot="1" noChangeAspect="1" noChangeArrowheads="1" noTextEdit="1"/>
           </p:cNvSpPr>
           <p:nvPr>
             <p:ph type="sldImg" idx="2"/>
@@ -830,10 +839,7 @@
             <a:pPr>
               <a:defRPr/>
             </a:pPr>
-            <a:r>
-              <a:rPr lang="de-DE"/>
-              <a:t>Prof. Dr. Max Mustermann | Musterfakultät</a:t>
-            </a:r>
+            <a:endParaRPr lang="de-DE"/>
           </a:p>
         </p:txBody>
       </p:sp>

</xml_diff>